<commit_message>
Underlines, missing titles, etc
</commit_message>
<xml_diff>
--- a/tutorial-11-interoperability.pptx
+++ b/tutorial-11-interoperability.pptx
@@ -206,7 +206,7 @@
           <a:p>
             <a:fld id="{775CE290-E0F5-444C-B849-A8F17CD4104C}" type="datetimeFigureOut">
               <a:rPr lang="en-US" smtClean="0"/>
-              <a:t>9/8/14</a:t>
+              <a:t>9/9/14</a:t>
             </a:fld>
             <a:endParaRPr lang="en-US"/>
           </a:p>
@@ -372,7 +372,7 @@
           <a:p>
             <a:fld id="{AD53A24C-4135-094C-957B-35852E7EDFA4}" type="datetimeFigureOut">
               <a:rPr lang="en-US" smtClean="0"/>
-              <a:t>9/8/14</a:t>
+              <a:t>9/9/14</a:t>
             </a:fld>
             <a:endParaRPr lang="en-US"/>
           </a:p>
@@ -833,7 +833,7 @@
           <a:p>
             <a:fld id="{B594EA25-E4F4-3746-A0BA-A11E27330E0F}" type="datetime2">
               <a:rPr lang="en-US" smtClean="0"/>
-              <a:t>Monday, September 8, 14</a:t>
+              <a:t>Tuesday, September 9, 14</a:t>
             </a:fld>
             <a:endParaRPr lang="en-US"/>
           </a:p>
@@ -1136,7 +1136,7 @@
                 <a:latin typeface="Times New Roman"/>
                 <a:cs typeface="Times New Roman"/>
               </a:rPr>
-              <a:t>September 8, 2014</a:t>
+              <a:t>September 9, 2014</a:t>
             </a:fld>
             <a:endParaRPr lang="en-US" dirty="0">
               <a:latin typeface="Times New Roman"/>
@@ -1423,7 +1423,7 @@
           <a:p>
             <a:fld id="{EA699BF9-66CB-F244-8E74-7B1BE1C77046}" type="datetime2">
               <a:rPr lang="en-US" smtClean="0"/>
-              <a:t>Monday, September 8, 14</a:t>
+              <a:t>Tuesday, September 9, 14</a:t>
             </a:fld>
             <a:endParaRPr lang="en-US"/>
           </a:p>
@@ -1734,7 +1734,7 @@
           <a:p>
             <a:fld id="{D300BE84-9843-8B4F-B3C8-647B06AC46C9}" type="datetime2">
               <a:rPr lang="en-US" smtClean="0"/>
-              <a:t>Monday, September 8, 14</a:t>
+              <a:t>Tuesday, September 9, 14</a:t>
             </a:fld>
             <a:endParaRPr lang="en-US"/>
           </a:p>
@@ -1905,7 +1905,7 @@
           <a:p>
             <a:fld id="{C460AE39-2092-A945-8296-F25085B9A0F1}" type="datetime2">
               <a:rPr lang="en-US" smtClean="0"/>
-              <a:t>Monday, September 8, 14</a:t>
+              <a:t>Tuesday, September 9, 14</a:t>
             </a:fld>
             <a:endParaRPr lang="en-US"/>
           </a:p>
@@ -2086,7 +2086,7 @@
           <a:p>
             <a:fld id="{63BC7E9D-3218-5E49-A867-E087AB2F4618}" type="datetime2">
               <a:rPr lang="en-US" smtClean="0"/>
-              <a:t>Monday, September 8, 14</a:t>
+              <a:t>Tuesday, September 9, 14</a:t>
             </a:fld>
             <a:endParaRPr lang="en-US"/>
           </a:p>
@@ -2257,7 +2257,7 @@
           <a:p>
             <a:fld id="{34621E95-60A9-FF44-9869-513D9D7A859F}" type="datetime2">
               <a:rPr lang="en-US" smtClean="0"/>
-              <a:t>Monday, September 8, 14</a:t>
+              <a:t>Tuesday, September 9, 14</a:t>
             </a:fld>
             <a:endParaRPr lang="en-US"/>
           </a:p>
@@ -2376,7 +2376,7 @@
           <a:p>
             <a:fld id="{BD5AFB16-13FE-DF4A-8CB7-09756A57B2EA}" type="datetime2">
               <a:rPr lang="en-US" smtClean="0"/>
-              <a:t>Monday, September 8, 14</a:t>
+              <a:t>Tuesday, September 9, 14</a:t>
             </a:fld>
             <a:endParaRPr lang="en-US" dirty="0"/>
           </a:p>
@@ -2863,7 +2863,7 @@
           <a:p>
             <a:fld id="{1BDEC705-8EA9-6C46-8E3B-2CAC7E2C0F7D}" type="datetime2">
               <a:rPr lang="en-US" smtClean="0"/>
-              <a:t>Monday, September 8, 14</a:t>
+              <a:t>Tuesday, September 9, 14</a:t>
             </a:fld>
             <a:endParaRPr lang="en-US"/>
           </a:p>
@@ -3194,7 +3194,7 @@
           <a:p>
             <a:fld id="{BF613BD3-C5FD-9543-B738-679BF38D8C83}" type="datetime2">
               <a:rPr lang="en-US" smtClean="0"/>
-              <a:t>Monday, September 8, 14</a:t>
+              <a:t>Tuesday, September 9, 14</a:t>
             </a:fld>
             <a:endParaRPr lang="en-US" dirty="0"/>
           </a:p>
@@ -3673,7 +3673,7 @@
           <a:p>
             <a:fld id="{4B5E4F0C-9A9C-5448-99FD-D30288B385C9}" type="datetime2">
               <a:rPr lang="en-US" smtClean="0"/>
-              <a:t>Monday, September 8, 14</a:t>
+              <a:t>Tuesday, September 9, 14</a:t>
             </a:fld>
             <a:endParaRPr lang="en-US"/>
           </a:p>
@@ -3969,7 +3969,7 @@
           <a:p>
             <a:fld id="{30545249-FD76-6844-B252-CAB05FC2DAA8}" type="datetime2">
               <a:rPr lang="en-US" smtClean="0"/>
-              <a:t>Monday, September 8, 14</a:t>
+              <a:t>Tuesday, September 9, 14</a:t>
             </a:fld>
             <a:endParaRPr lang="en-US" dirty="0"/>
           </a:p>
@@ -4213,7 +4213,7 @@
           <a:p>
             <a:fld id="{CC859171-EEDD-0B48-A5C0-E7218AE20EA7}" type="datetime2">
               <a:rPr lang="en-US" smtClean="0"/>
-              <a:t>Monday, September 8, 14</a:t>
+              <a:t>Tuesday, September 9, 14</a:t>
             </a:fld>
             <a:endParaRPr lang="en-US"/>
           </a:p>
@@ -4309,7 +4309,7 @@
           <a:p>
             <a:fld id="{C32F9216-0342-7440-9504-BD6C1382BF27}" type="datetime2">
               <a:rPr lang="en-US" smtClean="0"/>
-              <a:t>Monday, September 8, 14</a:t>
+              <a:t>Tuesday, September 9, 14</a:t>
             </a:fld>
             <a:endParaRPr lang="en-US"/>
           </a:p>
@@ -4580,7 +4580,7 @@
           <a:p>
             <a:fld id="{D36DC8F2-AD63-E841-8C23-5DC3A41041BE}" type="datetime2">
               <a:rPr lang="en-US" smtClean="0"/>
-              <a:t>Monday, September 8, 14</a:t>
+              <a:t>Tuesday, September 9, 14</a:t>
             </a:fld>
             <a:endParaRPr lang="en-US" dirty="0"/>
           </a:p>
@@ -5299,7 +5299,7 @@
           <a:p>
             <a:fld id="{7DCE861A-EA6B-EA43-8AA5-DB216DBB40BC}" type="datetime2">
               <a:rPr lang="en-US" smtClean="0"/>
-              <a:t>Monday, September 8, 14</a:t>
+              <a:t>Tuesday, September 9, 14</a:t>
             </a:fld>
             <a:endParaRPr lang="en-US"/>
           </a:p>
@@ -5575,29 +5575,81 @@
             </a:r>
             <a:r>
               <a:rPr lang="en-US" dirty="0"/>
-              <a:t>* compilers ./build AMPI net-linux-x86 64 –with-production –enable-tracing -j8 </a:t>
-            </a:r>
-            <a:r>
-              <a:rPr lang="en-US" dirty="0" err="1"/>
+              <a:t>* compilers </a:t>
+            </a:r>
+            <a:r>
+              <a:rPr lang="en-US" dirty="0" smtClean="0"/>
+              <a:t/>
+            </a:r>
+            <a:br>
+              <a:rPr lang="en-US" dirty="0" smtClean="0"/>
+            </a:br>
+            <a:r>
+              <a:rPr lang="en-US" dirty="0" smtClean="0"/>
+              <a:t/>
+            </a:r>
+            <a:br>
+              <a:rPr lang="en-US" dirty="0" smtClean="0"/>
+            </a:br>
+            <a:r>
+              <a:rPr lang="en-US" sz="2200" dirty="0" smtClean="0"/>
+              <a:t>.</a:t>
+            </a:r>
+            <a:r>
+              <a:rPr lang="en-US" sz="2200" dirty="0"/>
+              <a:t>/build AMPI net-linux-</a:t>
+            </a:r>
+            <a:r>
+              <a:rPr lang="en-US" sz="2200" dirty="0" smtClean="0"/>
+              <a:t>x86_64 --with</a:t>
+            </a:r>
+            <a:r>
+              <a:rPr lang="en-US" sz="2200" dirty="0"/>
+              <a:t>-production </a:t>
+            </a:r>
+            <a:r>
+              <a:rPr lang="en-US" sz="2200" dirty="0" smtClean="0"/>
+              <a:t>--enable</a:t>
+            </a:r>
+            <a:r>
+              <a:rPr lang="en-US" sz="2200" dirty="0"/>
+              <a:t>-tracing -j8 </a:t>
+            </a:r>
+            <a:r>
+              <a:rPr lang="en-US" sz="2200" dirty="0" smtClean="0"/>
+              <a:t/>
+            </a:r>
+            <a:br>
+              <a:rPr lang="en-US" sz="2200" dirty="0" smtClean="0"/>
+            </a:br>
+            <a:r>
+              <a:rPr lang="en-US" sz="2200" dirty="0" smtClean="0"/>
+              <a:t/>
+            </a:r>
+            <a:br>
+              <a:rPr lang="en-US" sz="2200" dirty="0" smtClean="0"/>
+            </a:br>
+            <a:r>
+              <a:rPr lang="en-US" sz="2200" dirty="0" err="1" smtClean="0"/>
               <a:t>ampiCC</a:t>
             </a:r>
             <a:r>
-              <a:rPr lang="en-US" dirty="0"/>
+              <a:rPr lang="en-US" sz="2200" dirty="0" smtClean="0"/>
               <a:t> </a:t>
             </a:r>
             <a:r>
-              <a:rPr lang="en-US" dirty="0" err="1"/>
+              <a:rPr lang="en-US" sz="2200" dirty="0" err="1"/>
               <a:t>myAMPIpgm.C</a:t>
             </a:r>
             <a:r>
-              <a:rPr lang="en-US" dirty="0"/>
+              <a:rPr lang="en-US" sz="2200" dirty="0"/>
               <a:t> -o </a:t>
             </a:r>
             <a:r>
-              <a:rPr lang="en-US" dirty="0" err="1"/>
+              <a:rPr lang="en-US" sz="2200" dirty="0" err="1"/>
               <a:t>myAMPIpgm</a:t>
             </a:r>
-            <a:endParaRPr lang="en-US" dirty="0"/>
+            <a:endParaRPr lang="en-US" sz="2200" dirty="0"/>
           </a:p>
         </p:txBody>
       </p:sp>
@@ -5618,7 +5670,7 @@
           <a:p>
             <a:fld id="{34621E95-60A9-FF44-9869-513D9D7A859F}" type="datetime2">
               <a:rPr lang="en-US" smtClean="0"/>
-              <a:t>Monday, September 8, 14</a:t>
+              <a:t>Tuesday, September 9, 14</a:t>
             </a:fld>
             <a:endParaRPr lang="en-US"/>
           </a:p>
@@ -5682,6 +5734,13 @@
   <p:clrMapOvr>
     <a:masterClrMapping/>
   </p:clrMapOvr>
+  <p:timing>
+    <p:tnLst>
+      <p:par>
+        <p:cTn xmlns:p14="http://schemas.microsoft.com/office/powerpoint/2010/main" id="1" dur="indefinite" restart="never" nodeType="tmRoot"/>
+      </p:par>
+    </p:tnLst>
+  </p:timing>
 </p:sld>
 </file>
 
@@ -5804,7 +5863,7 @@
           <a:p>
             <a:fld id="{34621E95-60A9-FF44-9869-513D9D7A859F}" type="datetime2">
               <a:rPr lang="en-US" smtClean="0"/>
-              <a:t>Monday, September 8, 14</a:t>
+              <a:t>Tuesday, September 9, 14</a:t>
             </a:fld>
             <a:endParaRPr lang="en-US"/>
           </a:p>
@@ -5868,6 +5927,13 @@
   <p:clrMapOvr>
     <a:masterClrMapping/>
   </p:clrMapOvr>
+  <p:timing>
+    <p:tnLst>
+      <p:par>
+        <p:cTn xmlns:p14="http://schemas.microsoft.com/office/powerpoint/2010/main" id="1" dur="indefinite" restart="never" nodeType="tmRoot"/>
+      </p:par>
+    </p:tnLst>
+  </p:timing>
 </p:sld>
 </file>
 
@@ -5936,7 +6002,7 @@
           <a:p>
             <a:fld id="{34621E95-60A9-FF44-9869-513D9D7A859F}" type="datetime2">
               <a:rPr lang="en-US" smtClean="0"/>
-              <a:t>Monday, September 8, 14</a:t>
+              <a:t>Tuesday, September 9, 14</a:t>
             </a:fld>
             <a:endParaRPr lang="en-US"/>
           </a:p>
@@ -6272,7 +6338,7 @@
           <a:p>
             <a:fld id="{BD5AFB16-13FE-DF4A-8CB7-09756A57B2EA}" type="datetime2">
               <a:rPr lang="en-US" smtClean="0"/>
-              <a:t>Monday, September 8, 14</a:t>
+              <a:t>Tuesday, September 9, 14</a:t>
             </a:fld>
             <a:endParaRPr lang="en-US" dirty="0"/>
           </a:p>
@@ -6586,9 +6652,10 @@
               <a:buNone/>
             </a:pPr>
             <a:r>
-              <a:rPr lang="en-US" b="1" dirty="0"/>
+              <a:rPr lang="en-US" b="1" dirty="0" smtClean="0"/>
               <a:t>else</a:t>
             </a:r>
+            <a:endParaRPr lang="en-US" b="1" dirty="0"/>
           </a:p>
           <a:p>
             <a:pPr marL="0" indent="0">
@@ -6596,7 +6663,11 @@
             </a:pPr>
             <a:r>
               <a:rPr lang="en-US" i="1" dirty="0" smtClean="0"/>
-              <a:t>//do MPI work on other set</a:t>
+              <a:t>   /</a:t>
+            </a:r>
+            <a:r>
+              <a:rPr lang="en-US" i="1" dirty="0" smtClean="0"/>
+              <a:t>/do MPI work on other set</a:t>
             </a:r>
             <a:endParaRPr lang="en-US" i="1" dirty="0"/>
           </a:p>
@@ -6670,6 +6741,13 @@
   <p:clrMapOvr>
     <a:masterClrMapping/>
   </p:clrMapOvr>
+  <p:timing>
+    <p:tnLst>
+      <p:par>
+        <p:cTn xmlns:p14="http://schemas.microsoft.com/office/powerpoint/2010/main" id="1" dur="indefinite" restart="never" nodeType="tmRoot"/>
+      </p:par>
+    </p:tnLst>
+  </p:timing>
 </p:sld>
 </file>
 
@@ -6707,7 +6785,11 @@
           </a:bodyPr>
           <a:lstStyle/>
           <a:p>
-            <a:endParaRPr lang="en-US"/>
+            <a:r>
+              <a:rPr lang="en-US" dirty="0" smtClean="0"/>
+              <a:t>Enabling Interoperability</a:t>
+            </a:r>
+            <a:endParaRPr lang="en-US" dirty="0"/>
           </a:p>
         </p:txBody>
       </p:sp>
@@ -6728,7 +6810,7 @@
           <a:p>
             <a:fld id="{BD5AFB16-13FE-DF4A-8CB7-09756A57B2EA}" type="datetime2">
               <a:rPr lang="en-US" smtClean="0"/>
-              <a:t>Monday, September 8, 14</a:t>
+              <a:t>Tuesday, September 9, 14</a:t>
             </a:fld>
             <a:endParaRPr lang="en-US" dirty="0"/>
           </a:p>

</xml_diff>